<commit_message>
Update Storage component diagram to fix component naming
</commit_message>
<xml_diff>
--- a/images/backendStorageOverview.pptx
+++ b/images/backendStorageOverview.pptx
@@ -212,7 +212,7 @@
             <a:fld id="{5D8FA8FF-20DC-44E5-8C35-13EAF0A5698C}" type="datetimeFigureOut">
               <a:rPr lang="en-SG" smtClean="0"/>
               <a:pPr/>
-              <a:t>14/11/18</a:t>
+              <a:t>5/9/2019</a:t>
             </a:fld>
             <a:endParaRPr lang="en-SG"/>
           </a:p>
@@ -661,7 +661,7 @@
             <a:fld id="{1D8BD707-D9CF-40AE-B4C6-C98DA3205C09}" type="datetimeFigureOut">
               <a:rPr lang="en-US" smtClean="0"/>
               <a:pPr/>
-              <a:t>11/14/18</a:t>
+              <a:t>9/5/2019</a:t>
             </a:fld>
             <a:endParaRPr lang="en-US"/>
           </a:p>
@@ -826,7 +826,7 @@
             <a:fld id="{1D8BD707-D9CF-40AE-B4C6-C98DA3205C09}" type="datetimeFigureOut">
               <a:rPr lang="en-US" smtClean="0"/>
               <a:pPr/>
-              <a:t>11/14/18</a:t>
+              <a:t>9/5/2019</a:t>
             </a:fld>
             <a:endParaRPr lang="en-US"/>
           </a:p>
@@ -1001,7 +1001,7 @@
             <a:fld id="{1D8BD707-D9CF-40AE-B4C6-C98DA3205C09}" type="datetimeFigureOut">
               <a:rPr lang="en-US" smtClean="0"/>
               <a:pPr/>
-              <a:t>11/14/18</a:t>
+              <a:t>9/5/2019</a:t>
             </a:fld>
             <a:endParaRPr lang="en-US"/>
           </a:p>
@@ -1166,7 +1166,7 @@
             <a:fld id="{1D8BD707-D9CF-40AE-B4C6-C98DA3205C09}" type="datetimeFigureOut">
               <a:rPr lang="en-US" smtClean="0"/>
               <a:pPr/>
-              <a:t>11/14/18</a:t>
+              <a:t>9/5/2019</a:t>
             </a:fld>
             <a:endParaRPr lang="en-US"/>
           </a:p>
@@ -1408,7 +1408,7 @@
             <a:fld id="{1D8BD707-D9CF-40AE-B4C6-C98DA3205C09}" type="datetimeFigureOut">
               <a:rPr lang="en-US" smtClean="0"/>
               <a:pPr/>
-              <a:t>11/14/18</a:t>
+              <a:t>9/5/2019</a:t>
             </a:fld>
             <a:endParaRPr lang="en-US"/>
           </a:p>
@@ -1690,7 +1690,7 @@
             <a:fld id="{1D8BD707-D9CF-40AE-B4C6-C98DA3205C09}" type="datetimeFigureOut">
               <a:rPr lang="en-US" smtClean="0"/>
               <a:pPr/>
-              <a:t>11/14/18</a:t>
+              <a:t>9/5/2019</a:t>
             </a:fld>
             <a:endParaRPr lang="en-US"/>
           </a:p>
@@ -2106,7 +2106,7 @@
             <a:fld id="{1D8BD707-D9CF-40AE-B4C6-C98DA3205C09}" type="datetimeFigureOut">
               <a:rPr lang="en-US" smtClean="0"/>
               <a:pPr/>
-              <a:t>11/14/18</a:t>
+              <a:t>9/5/2019</a:t>
             </a:fld>
             <a:endParaRPr lang="en-US"/>
           </a:p>
@@ -2220,7 +2220,7 @@
             <a:fld id="{1D8BD707-D9CF-40AE-B4C6-C98DA3205C09}" type="datetimeFigureOut">
               <a:rPr lang="en-US" smtClean="0"/>
               <a:pPr/>
-              <a:t>11/14/18</a:t>
+              <a:t>9/5/2019</a:t>
             </a:fld>
             <a:endParaRPr lang="en-US"/>
           </a:p>
@@ -2312,7 +2312,7 @@
             <a:fld id="{1D8BD707-D9CF-40AE-B4C6-C98DA3205C09}" type="datetimeFigureOut">
               <a:rPr lang="en-US" smtClean="0"/>
               <a:pPr/>
-              <a:t>11/14/18</a:t>
+              <a:t>9/5/2019</a:t>
             </a:fld>
             <a:endParaRPr lang="en-US"/>
           </a:p>
@@ -2584,7 +2584,7 @@
             <a:fld id="{1D8BD707-D9CF-40AE-B4C6-C98DA3205C09}" type="datetimeFigureOut">
               <a:rPr lang="en-US" smtClean="0"/>
               <a:pPr/>
-              <a:t>11/14/18</a:t>
+              <a:t>9/5/2019</a:t>
             </a:fld>
             <a:endParaRPr lang="en-US"/>
           </a:p>
@@ -2833,7 +2833,7 @@
             <a:fld id="{1D8BD707-D9CF-40AE-B4C6-C98DA3205C09}" type="datetimeFigureOut">
               <a:rPr lang="en-US" smtClean="0"/>
               <a:pPr/>
-              <a:t>11/14/18</a:t>
+              <a:t>9/5/2019</a:t>
             </a:fld>
             <a:endParaRPr lang="en-US"/>
           </a:p>
@@ -3041,7 +3041,7 @@
             <a:fld id="{1D8BD707-D9CF-40AE-B4C6-C98DA3205C09}" type="datetimeFigureOut">
               <a:rPr lang="en-US" smtClean="0"/>
               <a:pPr/>
-              <a:t>11/14/18</a:t>
+              <a:t>9/5/2019</a:t>
             </a:fld>
             <a:endParaRPr lang="en-US"/>
           </a:p>
@@ -3523,7 +3523,7 @@
           <a:p>
             <a:pPr algn="ctr"/>
             <a:r>
-              <a:rPr lang="en-US" sz="1600" b="1" dirty="0" err="1" smtClean="0"/>
+              <a:rPr lang="en-US" sz="1600" b="1" dirty="0" err="1"/>
               <a:t>AnalysisLogic</a:t>
             </a:r>
             <a:endParaRPr lang="en-SG" sz="1600" b="1" dirty="0"/>
@@ -3582,7 +3582,7 @@
           <a:p>
             <a:pPr algn="ctr"/>
             <a:r>
-              <a:rPr lang="en-US" sz="1600" b="1" dirty="0" err="1" smtClean="0"/>
+              <a:rPr lang="en-US" sz="1600" b="1" dirty="0" err="1"/>
               <a:t>GateKeeper</a:t>
             </a:r>
             <a:endParaRPr lang="en-SG" sz="1600" b="1" dirty="0"/>
@@ -3641,7 +3641,7 @@
           <a:p>
             <a:pPr algn="ctr"/>
             <a:r>
-              <a:rPr lang="en-US" sz="1600" b="1" dirty="0" err="1" smtClean="0"/>
+              <a:rPr lang="en-US" sz="1600" b="1" dirty="0" err="1"/>
               <a:t>DBMetaDataLogic</a:t>
             </a:r>
             <a:endParaRPr lang="en-SG" sz="1600" b="1" dirty="0"/>
@@ -4188,7 +4188,7 @@
         <p:spPr>
           <a:xfrm>
             <a:off x="3939381" y="3212287"/>
-            <a:ext cx="2590800" cy="381000"/>
+            <a:ext cx="2971800" cy="381000"/>
           </a:xfrm>
           <a:prstGeom prst="roundRect">
             <a:avLst>
@@ -4231,7 +4231,7 @@
           <a:p>
             <a:pPr algn="ctr"/>
             <a:r>
-              <a:rPr lang="en-US" sz="1600" b="1"/>
+              <a:rPr lang="en-US" sz="1600" b="1" dirty="0" err="1"/>
               <a:t>PresentationSectionRepository</a:t>
             </a:r>
             <a:endParaRPr lang="en-SG" sz="1600" b="1" dirty="0"/>
@@ -4719,12 +4719,12 @@
         </p:nvCxnSpPr>
         <p:spPr>
           <a:xfrm flipV="1">
-            <a:off x="6530181" y="2989510"/>
-            <a:ext cx="1199461" cy="413277"/>
+            <a:off x="6911181" y="2989510"/>
+            <a:ext cx="818461" cy="413277"/>
           </a:xfrm>
           <a:prstGeom prst="bentConnector3">
             <a:avLst>
-              <a:gd name="adj1" fmla="val 84250"/>
+              <a:gd name="adj1" fmla="val 66104"/>
             </a:avLst>
           </a:prstGeom>
           <a:ln w="38100">
@@ -4996,7 +4996,7 @@
           <a:lstStyle/>
           <a:p>
             <a:r>
-              <a:rPr lang="en-US" smtClean="0"/>
+              <a:rPr lang="en-US"/>
               <a:t>SQL Query</a:t>
             </a:r>
             <a:endParaRPr lang="en-US" dirty="0"/>

</xml_diff>

<commit_message>
Update coauthor related in diagram
</commit_message>
<xml_diff>
--- a/images/backendStorageOverview.pptx
+++ b/images/backendStorageOverview.pptx
@@ -212,7 +212,7 @@
             <a:fld id="{5D8FA8FF-20DC-44E5-8C35-13EAF0A5698C}" type="datetimeFigureOut">
               <a:rPr lang="en-SG" smtClean="0"/>
               <a:pPr/>
-              <a:t>5/9/2019</a:t>
+              <a:t>13/11/2019</a:t>
             </a:fld>
             <a:endParaRPr lang="en-SG"/>
           </a:p>
@@ -661,7 +661,7 @@
             <a:fld id="{1D8BD707-D9CF-40AE-B4C6-C98DA3205C09}" type="datetimeFigureOut">
               <a:rPr lang="en-US" smtClean="0"/>
               <a:pPr/>
-              <a:t>9/5/2019</a:t>
+              <a:t>11/13/2019</a:t>
             </a:fld>
             <a:endParaRPr lang="en-US"/>
           </a:p>
@@ -826,7 +826,7 @@
             <a:fld id="{1D8BD707-D9CF-40AE-B4C6-C98DA3205C09}" type="datetimeFigureOut">
               <a:rPr lang="en-US" smtClean="0"/>
               <a:pPr/>
-              <a:t>9/5/2019</a:t>
+              <a:t>11/13/2019</a:t>
             </a:fld>
             <a:endParaRPr lang="en-US"/>
           </a:p>
@@ -1001,7 +1001,7 @@
             <a:fld id="{1D8BD707-D9CF-40AE-B4C6-C98DA3205C09}" type="datetimeFigureOut">
               <a:rPr lang="en-US" smtClean="0"/>
               <a:pPr/>
-              <a:t>9/5/2019</a:t>
+              <a:t>11/13/2019</a:t>
             </a:fld>
             <a:endParaRPr lang="en-US"/>
           </a:p>
@@ -1166,7 +1166,7 @@
             <a:fld id="{1D8BD707-D9CF-40AE-B4C6-C98DA3205C09}" type="datetimeFigureOut">
               <a:rPr lang="en-US" smtClean="0"/>
               <a:pPr/>
-              <a:t>9/5/2019</a:t>
+              <a:t>11/13/2019</a:t>
             </a:fld>
             <a:endParaRPr lang="en-US"/>
           </a:p>
@@ -1408,7 +1408,7 @@
             <a:fld id="{1D8BD707-D9CF-40AE-B4C6-C98DA3205C09}" type="datetimeFigureOut">
               <a:rPr lang="en-US" smtClean="0"/>
               <a:pPr/>
-              <a:t>9/5/2019</a:t>
+              <a:t>11/13/2019</a:t>
             </a:fld>
             <a:endParaRPr lang="en-US"/>
           </a:p>
@@ -1690,7 +1690,7 @@
             <a:fld id="{1D8BD707-D9CF-40AE-B4C6-C98DA3205C09}" type="datetimeFigureOut">
               <a:rPr lang="en-US" smtClean="0"/>
               <a:pPr/>
-              <a:t>9/5/2019</a:t>
+              <a:t>11/13/2019</a:t>
             </a:fld>
             <a:endParaRPr lang="en-US"/>
           </a:p>
@@ -2106,7 +2106,7 @@
             <a:fld id="{1D8BD707-D9CF-40AE-B4C6-C98DA3205C09}" type="datetimeFigureOut">
               <a:rPr lang="en-US" smtClean="0"/>
               <a:pPr/>
-              <a:t>9/5/2019</a:t>
+              <a:t>11/13/2019</a:t>
             </a:fld>
             <a:endParaRPr lang="en-US"/>
           </a:p>
@@ -2220,7 +2220,7 @@
             <a:fld id="{1D8BD707-D9CF-40AE-B4C6-C98DA3205C09}" type="datetimeFigureOut">
               <a:rPr lang="en-US" smtClean="0"/>
               <a:pPr/>
-              <a:t>9/5/2019</a:t>
+              <a:t>11/13/2019</a:t>
             </a:fld>
             <a:endParaRPr lang="en-US"/>
           </a:p>
@@ -2312,7 +2312,7 @@
             <a:fld id="{1D8BD707-D9CF-40AE-B4C6-C98DA3205C09}" type="datetimeFigureOut">
               <a:rPr lang="en-US" smtClean="0"/>
               <a:pPr/>
-              <a:t>9/5/2019</a:t>
+              <a:t>11/13/2019</a:t>
             </a:fld>
             <a:endParaRPr lang="en-US"/>
           </a:p>
@@ -2584,7 +2584,7 @@
             <a:fld id="{1D8BD707-D9CF-40AE-B4C6-C98DA3205C09}" type="datetimeFigureOut">
               <a:rPr lang="en-US" smtClean="0"/>
               <a:pPr/>
-              <a:t>9/5/2019</a:t>
+              <a:t>11/13/2019</a:t>
             </a:fld>
             <a:endParaRPr lang="en-US"/>
           </a:p>
@@ -2833,7 +2833,7 @@
             <a:fld id="{1D8BD707-D9CF-40AE-B4C6-C98DA3205C09}" type="datetimeFigureOut">
               <a:rPr lang="en-US" smtClean="0"/>
               <a:pPr/>
-              <a:t>9/5/2019</a:t>
+              <a:t>11/13/2019</a:t>
             </a:fld>
             <a:endParaRPr lang="en-US"/>
           </a:p>
@@ -3041,7 +3041,7 @@
             <a:fld id="{1D8BD707-D9CF-40AE-B4C6-C98DA3205C09}" type="datetimeFigureOut">
               <a:rPr lang="en-US" smtClean="0"/>
               <a:pPr/>
-              <a:t>9/5/2019</a:t>
+              <a:t>11/13/2019</a:t>
             </a:fld>
             <a:endParaRPr lang="en-US"/>
           </a:p>
@@ -3420,7 +3420,7 @@
         </p:nvSpPr>
         <p:spPr>
           <a:xfrm>
-            <a:off x="4191086" y="5553622"/>
+            <a:off x="4191086" y="4875961"/>
             <a:ext cx="2590800" cy="381000"/>
           </a:xfrm>
           <a:prstGeom prst="roundRect">
@@ -3479,7 +3479,7 @@
         </p:nvSpPr>
         <p:spPr>
           <a:xfrm>
-            <a:off x="728611" y="311572"/>
+            <a:off x="1104001" y="5501866"/>
             <a:ext cx="1524000" cy="391728"/>
           </a:xfrm>
           <a:prstGeom prst="roundRect">
@@ -3538,7 +3538,7 @@
         </p:nvSpPr>
         <p:spPr>
           <a:xfrm>
-            <a:off x="728611" y="869269"/>
+            <a:off x="728611" y="191608"/>
             <a:ext cx="1524000" cy="391728"/>
           </a:xfrm>
           <a:prstGeom prst="roundRect">
@@ -3597,7 +3597,7 @@
         </p:nvSpPr>
         <p:spPr>
           <a:xfrm>
-            <a:off x="728611" y="1378049"/>
+            <a:off x="728611" y="700388"/>
             <a:ext cx="1828800" cy="391728"/>
           </a:xfrm>
           <a:prstGeom prst="roundRect">
@@ -3656,7 +3656,7 @@
         </p:nvSpPr>
         <p:spPr>
           <a:xfrm>
-            <a:off x="119011" y="2660627"/>
+            <a:off x="119011" y="1982966"/>
             <a:ext cx="3048000" cy="391728"/>
           </a:xfrm>
           <a:prstGeom prst="roundRect">
@@ -3715,7 +3715,7 @@
         </p:nvSpPr>
         <p:spPr>
           <a:xfrm>
-            <a:off x="728611" y="2107846"/>
+            <a:off x="728611" y="1430185"/>
             <a:ext cx="1828800" cy="391728"/>
           </a:xfrm>
           <a:prstGeom prst="roundRect">
@@ -3774,7 +3774,7 @@
         </p:nvSpPr>
         <p:spPr>
           <a:xfrm>
-            <a:off x="503496" y="3194560"/>
+            <a:off x="503496" y="2516899"/>
             <a:ext cx="2438400" cy="391728"/>
           </a:xfrm>
           <a:prstGeom prst="roundRect">
@@ -3833,7 +3833,7 @@
         </p:nvSpPr>
         <p:spPr>
           <a:xfrm>
-            <a:off x="728611" y="5202566"/>
+            <a:off x="728611" y="4524905"/>
             <a:ext cx="1828800" cy="391728"/>
           </a:xfrm>
           <a:prstGeom prst="roundRect">
@@ -3892,7 +3892,7 @@
         </p:nvSpPr>
         <p:spPr>
           <a:xfrm>
-            <a:off x="4207824" y="5009155"/>
+            <a:off x="4207824" y="4331494"/>
             <a:ext cx="2484610" cy="381000"/>
           </a:xfrm>
           <a:prstGeom prst="roundRect">
@@ -3951,7 +3951,7 @@
         </p:nvSpPr>
         <p:spPr>
           <a:xfrm>
-            <a:off x="3939381" y="2660627"/>
+            <a:off x="3939381" y="1982966"/>
             <a:ext cx="3475210" cy="381000"/>
           </a:xfrm>
           <a:prstGeom prst="roundRect">
@@ -4010,7 +4010,7 @@
         </p:nvSpPr>
         <p:spPr>
           <a:xfrm>
-            <a:off x="4161096" y="3920221"/>
+            <a:off x="4161096" y="3242560"/>
             <a:ext cx="3475210" cy="381000"/>
           </a:xfrm>
           <a:prstGeom prst="roundRect">
@@ -4069,7 +4069,7 @@
         </p:nvSpPr>
         <p:spPr>
           <a:xfrm>
-            <a:off x="3939381" y="2007394"/>
+            <a:off x="3939381" y="1329733"/>
             <a:ext cx="2286000" cy="381000"/>
           </a:xfrm>
           <a:prstGeom prst="roundRect">
@@ -4128,7 +4128,7 @@
         </p:nvSpPr>
         <p:spPr>
           <a:xfrm>
-            <a:off x="4191086" y="4464688"/>
+            <a:off x="4191086" y="3787027"/>
             <a:ext cx="2971800" cy="381000"/>
           </a:xfrm>
           <a:prstGeom prst="roundRect">
@@ -4187,7 +4187,7 @@
         </p:nvSpPr>
         <p:spPr>
           <a:xfrm>
-            <a:off x="3939381" y="3212287"/>
+            <a:off x="3939381" y="2534626"/>
             <a:ext cx="2971800" cy="381000"/>
           </a:xfrm>
           <a:prstGeom prst="roundRect">
@@ -4250,7 +4250,7 @@
         </p:nvCxnSpPr>
         <p:spPr>
           <a:xfrm flipV="1">
-            <a:off x="2557411" y="4110721"/>
+            <a:off x="2557411" y="3433060"/>
             <a:ext cx="1603685" cy="1287709"/>
           </a:xfrm>
           <a:prstGeom prst="straightConnector1">
@@ -4294,7 +4294,7 @@
         </p:nvCxnSpPr>
         <p:spPr>
           <a:xfrm flipV="1">
-            <a:off x="2557411" y="4655188"/>
+            <a:off x="2557411" y="3977527"/>
             <a:ext cx="1633675" cy="743242"/>
           </a:xfrm>
           <a:prstGeom prst="straightConnector1">
@@ -4338,7 +4338,7 @@
         </p:nvCxnSpPr>
         <p:spPr>
           <a:xfrm flipV="1">
-            <a:off x="2557411" y="5199655"/>
+            <a:off x="2557411" y="4521994"/>
             <a:ext cx="1650413" cy="198775"/>
           </a:xfrm>
           <a:prstGeom prst="straightConnector1">
@@ -4382,7 +4382,7 @@
         </p:nvCxnSpPr>
         <p:spPr>
           <a:xfrm>
-            <a:off x="2557411" y="5398430"/>
+            <a:off x="2557411" y="4720769"/>
             <a:ext cx="1633675" cy="345692"/>
           </a:xfrm>
           <a:prstGeom prst="straightConnector1">
@@ -4426,7 +4426,7 @@
         </p:nvCxnSpPr>
         <p:spPr>
           <a:xfrm>
-            <a:off x="2941896" y="3390424"/>
+            <a:off x="2941896" y="2712763"/>
             <a:ext cx="997485" cy="12363"/>
           </a:xfrm>
           <a:prstGeom prst="straightConnector1">
@@ -4470,7 +4470,7 @@
         </p:nvCxnSpPr>
         <p:spPr>
           <a:xfrm flipV="1">
-            <a:off x="3167011" y="2851127"/>
+            <a:off x="3167011" y="2173466"/>
             <a:ext cx="772370" cy="5364"/>
           </a:xfrm>
           <a:prstGeom prst="straightConnector1">
@@ -4514,7 +4514,7 @@
         </p:nvCxnSpPr>
         <p:spPr>
           <a:xfrm flipV="1">
-            <a:off x="2557411" y="2197894"/>
+            <a:off x="2557411" y="1520233"/>
             <a:ext cx="1381970" cy="105816"/>
           </a:xfrm>
           <a:prstGeom prst="straightConnector1">
@@ -4554,7 +4554,7 @@
         </p:nvSpPr>
         <p:spPr>
           <a:xfrm rot="16200000">
-            <a:off x="7471371" y="2561981"/>
+            <a:off x="7471371" y="1884320"/>
             <a:ext cx="1371600" cy="855058"/>
           </a:xfrm>
           <a:prstGeom prst="flowChartMagneticDrum">
@@ -4627,7 +4627,7 @@
         </p:nvCxnSpPr>
         <p:spPr>
           <a:xfrm>
-            <a:off x="6225381" y="2197894"/>
+            <a:off x="6225381" y="1520233"/>
             <a:ext cx="1504261" cy="791616"/>
           </a:xfrm>
           <a:prstGeom prst="bentConnector3">
@@ -4673,7 +4673,7 @@
         </p:nvCxnSpPr>
         <p:spPr>
           <a:xfrm>
-            <a:off x="7414591" y="2851127"/>
+            <a:off x="7414591" y="2173466"/>
             <a:ext cx="315051" cy="138383"/>
           </a:xfrm>
           <a:prstGeom prst="bentConnector3">
@@ -4719,7 +4719,7 @@
         </p:nvCxnSpPr>
         <p:spPr>
           <a:xfrm flipV="1">
-            <a:off x="6911181" y="2989510"/>
+            <a:off x="6911181" y="2311849"/>
             <a:ext cx="818461" cy="413277"/>
           </a:xfrm>
           <a:prstGeom prst="bentConnector3">
@@ -4765,7 +4765,7 @@
         </p:nvCxnSpPr>
         <p:spPr>
           <a:xfrm flipV="1">
-            <a:off x="7636306" y="3675310"/>
+            <a:off x="7636306" y="2997649"/>
             <a:ext cx="520865" cy="435411"/>
           </a:xfrm>
           <a:prstGeom prst="bentConnector2">
@@ -4809,7 +4809,7 @@
         </p:nvCxnSpPr>
         <p:spPr>
           <a:xfrm flipV="1">
-            <a:off x="7162886" y="3675310"/>
+            <a:off x="7162886" y="2997649"/>
             <a:ext cx="994285" cy="979878"/>
           </a:xfrm>
           <a:prstGeom prst="bentConnector2">
@@ -4853,7 +4853,7 @@
         </p:nvCxnSpPr>
         <p:spPr>
           <a:xfrm flipV="1">
-            <a:off x="6692434" y="3675310"/>
+            <a:off x="6692434" y="2997649"/>
             <a:ext cx="1464737" cy="1524345"/>
           </a:xfrm>
           <a:prstGeom prst="bentConnector2">
@@ -4897,7 +4897,7 @@
         </p:nvCxnSpPr>
         <p:spPr>
           <a:xfrm flipV="1">
-            <a:off x="6781886" y="3675310"/>
+            <a:off x="6781886" y="2997649"/>
             <a:ext cx="1375285" cy="2068812"/>
           </a:xfrm>
           <a:prstGeom prst="bentConnector2">
@@ -4935,17 +4935,18 @@
           <p:cNvCxnSpPr>
             <a:cxnSpLocks/>
             <a:stCxn id="5" idx="3"/>
-            <a:endCxn id="41" idx="4"/>
           </p:cNvCxnSpPr>
           <p:nvPr/>
         </p:nvCxnSpPr>
         <p:spPr>
-          <a:xfrm>
-            <a:off x="2252611" y="507436"/>
-            <a:ext cx="5904560" cy="1796274"/>
-          </a:xfrm>
-          <a:prstGeom prst="bentConnector2">
-            <a:avLst/>
+          <a:xfrm flipV="1">
+            <a:off x="2628001" y="2997650"/>
+            <a:ext cx="5697550" cy="2700080"/>
+          </a:xfrm>
+          <a:prstGeom prst="bentConnector3">
+            <a:avLst>
+              <a:gd name="adj1" fmla="val 100079"/>
+            </a:avLst>
           </a:prstGeom>
           <a:ln w="38100">
             <a:solidFill>
@@ -4981,7 +4982,7 @@
         </p:nvSpPr>
         <p:spPr>
           <a:xfrm>
-            <a:off x="5234781" y="208009"/>
+            <a:off x="5610171" y="5398303"/>
             <a:ext cx="1118511" cy="353943"/>
           </a:xfrm>
           <a:prstGeom prst="rect">
@@ -5011,7 +5012,7 @@
         </p:nvSpPr>
         <p:spPr>
           <a:xfrm>
-            <a:off x="4349741" y="1193739"/>
+            <a:off x="4349741" y="516078"/>
             <a:ext cx="2200776" cy="554938"/>
           </a:xfrm>
           <a:prstGeom prst="cube">
@@ -5079,7 +5080,7 @@
         </p:nvCxnSpPr>
         <p:spPr>
           <a:xfrm>
-            <a:off x="2252611" y="1065133"/>
+            <a:off x="2252611" y="387472"/>
             <a:ext cx="2097130" cy="475442"/>
           </a:xfrm>
           <a:prstGeom prst="bentConnector3">
@@ -5125,7 +5126,7 @@
         </p:nvCxnSpPr>
         <p:spPr>
           <a:xfrm>
-            <a:off x="2252611" y="1065133"/>
+            <a:off x="2252611" y="387472"/>
             <a:ext cx="5477031" cy="1924377"/>
           </a:xfrm>
           <a:prstGeom prst="bentConnector3">
@@ -5140,6 +5141,55 @@
               </a:schemeClr>
             </a:solidFill>
             <a:prstDash val="sysDot"/>
+            <a:headEnd type="none" w="med" len="med"/>
+            <a:tailEnd type="triangle" w="med" len="med"/>
+          </a:ln>
+        </p:spPr>
+        <p:style>
+          <a:lnRef idx="1">
+            <a:schemeClr val="accent1"/>
+          </a:lnRef>
+          <a:fillRef idx="0">
+            <a:schemeClr val="accent1"/>
+          </a:fillRef>
+          <a:effectRef idx="0">
+            <a:schemeClr val="accent1"/>
+          </a:effectRef>
+          <a:fontRef idx="minor">
+            <a:schemeClr val="tx1"/>
+          </a:fontRef>
+        </p:style>
+      </p:cxnSp>
+      <p:cxnSp>
+        <p:nvCxnSpPr>
+          <p:cNvPr id="46" name="Elbow Connector 184">
+            <a:extLst>
+              <a:ext uri="{FF2B5EF4-FFF2-40B4-BE49-F238E27FC236}">
+                <a16:creationId xmlns:a16="http://schemas.microsoft.com/office/drawing/2014/main" id="{2EF00BA7-4F05-4AA3-BC51-8D227472119C}"/>
+              </a:ext>
+            </a:extLst>
+          </p:cNvPr>
+          <p:cNvCxnSpPr>
+            <a:cxnSpLocks/>
+            <a:stCxn id="5" idx="3"/>
+          </p:cNvCxnSpPr>
+          <p:nvPr/>
+        </p:nvCxnSpPr>
+        <p:spPr>
+          <a:xfrm flipV="1">
+            <a:off x="2628001" y="5221653"/>
+            <a:ext cx="1563085" cy="476077"/>
+          </a:xfrm>
+          <a:prstGeom prst="straightConnector1">
+            <a:avLst/>
+          </a:prstGeom>
+          <a:ln w="38100">
+            <a:solidFill>
+              <a:schemeClr val="accent4">
+                <a:lumMod val="75000"/>
+              </a:schemeClr>
+            </a:solidFill>
+            <a:prstDash val="solid"/>
             <a:headEnd type="none" w="med" len="med"/>
             <a:tailEnd type="triangle" w="med" len="med"/>
           </a:ln>

</xml_diff>